<commit_message>
Added google maps integration.
</commit_message>
<xml_diff>
--- a/Popya/docs/Presentation.pptx
+++ b/Popya/docs/Presentation.pptx
@@ -202,7 +202,7 @@
           <a:p>
             <a:fld id="{8816BB4D-EB0F-42E5-A9B4-24A03AFF9345}" type="datetimeFigureOut">
               <a:rPr lang="de-AT" smtClean="0"/>
-              <a:t>18.06.2012</a:t>
+              <a:t>20.06.2012</a:t>
             </a:fld>
             <a:endParaRPr lang="de-AT"/>
           </a:p>
@@ -1179,7 +1179,7 @@
           <a:p>
             <a:fld id="{7224D1BD-6E5B-443D-8CD4-CAA610A5FE02}" type="datetime1">
               <a:rPr lang="de-AT" smtClean="0"/>
-              <a:t>18.06.2012</a:t>
+              <a:t>20.06.2012</a:t>
             </a:fld>
             <a:endParaRPr lang="de-AT"/>
           </a:p>
@@ -1379,7 +1379,7 @@
           <a:p>
             <a:fld id="{287144CB-DDCB-49EE-91EE-28766BCB8171}" type="datetime1">
               <a:rPr lang="de-AT" smtClean="0"/>
-              <a:t>18.06.2012</a:t>
+              <a:t>20.06.2012</a:t>
             </a:fld>
             <a:endParaRPr lang="de-AT"/>
           </a:p>
@@ -1568,7 +1568,7 @@
           <a:p>
             <a:fld id="{5BD3FB18-7775-427D-9B55-48E180BB2E54}" type="datetime1">
               <a:rPr lang="de-AT" smtClean="0"/>
-              <a:t>18.06.2012</a:t>
+              <a:t>20.06.2012</a:t>
             </a:fld>
             <a:endParaRPr lang="de-AT"/>
           </a:p>
@@ -1722,7 +1722,7 @@
           <a:p>
             <a:fld id="{78DD3ADE-3785-4F18-93E5-D04CE1BF4F96}" type="datetime1">
               <a:rPr lang="de-AT" smtClean="0"/>
-              <a:t>18.06.2012</a:t>
+              <a:t>20.06.2012</a:t>
             </a:fld>
             <a:endParaRPr lang="de-AT"/>
           </a:p>
@@ -1981,7 +1981,7 @@
           <a:p>
             <a:fld id="{6B4BE4D5-B37B-430D-9316-D39A5F551AEA}" type="datetime1">
               <a:rPr lang="de-AT" smtClean="0"/>
-              <a:t>18.06.2012</a:t>
+              <a:t>20.06.2012</a:t>
             </a:fld>
             <a:endParaRPr lang="de-AT"/>
           </a:p>
@@ -2394,7 +2394,7 @@
           <a:p>
             <a:fld id="{90B37A67-3072-4BE5-A957-F161BCF6C405}" type="datetime1">
               <a:rPr lang="de-AT" smtClean="0"/>
-              <a:t>18.06.2012</a:t>
+              <a:t>20.06.2012</a:t>
             </a:fld>
             <a:endParaRPr lang="de-AT"/>
           </a:p>
@@ -2844,7 +2844,7 @@
           <a:p>
             <a:fld id="{C41E8E6F-1D3F-4A9B-A8BD-2F663AEAB09C}" type="datetime1">
               <a:rPr lang="de-AT" smtClean="0"/>
-              <a:t>18.06.2012</a:t>
+              <a:t>20.06.2012</a:t>
             </a:fld>
             <a:endParaRPr lang="de-AT"/>
           </a:p>
@@ -2949,7 +2949,7 @@
           <a:p>
             <a:fld id="{283414CD-9CA1-4B10-B2B3-B6C29FB76E1F}" type="datetime1">
               <a:rPr lang="de-AT" smtClean="0"/>
-              <a:t>18.06.2012</a:t>
+              <a:t>20.06.2012</a:t>
             </a:fld>
             <a:endParaRPr lang="de-AT"/>
           </a:p>
@@ -3074,7 +3074,7 @@
           <a:p>
             <a:fld id="{15CB45CC-B4B7-4B18-8806-29AB1D40E213}" type="datetime1">
               <a:rPr lang="de-AT" smtClean="0"/>
-              <a:t>18.06.2012</a:t>
+              <a:t>20.06.2012</a:t>
             </a:fld>
             <a:endParaRPr lang="de-AT"/>
           </a:p>
@@ -3352,7 +3352,7 @@
           <a:p>
             <a:fld id="{D99635E6-DB72-469A-B185-0ECEDBD4D37E}" type="datetime1">
               <a:rPr lang="de-AT" smtClean="0"/>
-              <a:t>18.06.2012</a:t>
+              <a:t>20.06.2012</a:t>
             </a:fld>
             <a:endParaRPr lang="de-AT"/>
           </a:p>
@@ -3561,7 +3561,7 @@
           <a:p>
             <a:fld id="{6AD0C4C6-CC44-49CF-9962-CF2B0B85B158}" type="datetime1">
               <a:rPr lang="de-AT" smtClean="0"/>
-              <a:t>18.06.2012</a:t>
+              <a:t>20.06.2012</a:t>
             </a:fld>
             <a:endParaRPr lang="de-AT"/>
           </a:p>
@@ -4674,7 +4674,7 @@
           <a:p>
             <a:fld id="{DE43649E-427B-4BFC-BF46-9A6A86D1E91C}" type="datetime1">
               <a:rPr lang="de-AT" smtClean="0"/>
-              <a:t>18.06.2012</a:t>
+              <a:t>20.06.2012</a:t>
             </a:fld>
             <a:endParaRPr lang="de-AT"/>
           </a:p>
@@ -5185,7 +5185,7 @@
           <a:p>
             <a:fld id="{57DF52FD-EA5C-4EDE-8FE8-8296EAF3A748}" type="datetime1">
               <a:rPr lang="de-AT" smtClean="0"/>
-              <a:t>18.06.2012</a:t>
+              <a:t>20.06.2012</a:t>
             </a:fld>
             <a:endParaRPr lang="de-AT"/>
           </a:p>
@@ -5485,8 +5485,50 @@
               <a:t> </a:t>
             </a:r>
             <a:r>
+              <a:rPr lang="de-AT" dirty="0" err="1" smtClean="0"/>
+              <a:t>onCreate</a:t>
+            </a:r>
+            <a:endParaRPr lang="de-AT" dirty="0" smtClean="0"/>
+          </a:p>
+          <a:p>
+            <a:r>
+              <a:rPr lang="de-AT" dirty="0" smtClean="0"/>
+              <a:t>Non-UI Thread </a:t>
+            </a:r>
+            <a:r>
+              <a:rPr lang="de-AT" dirty="0" err="1" smtClean="0"/>
+              <a:t>tries</a:t>
+            </a:r>
+            <a:r>
+              <a:rPr lang="de-AT" dirty="0" smtClean="0"/>
+              <a:t> </a:t>
+            </a:r>
+            <a:r>
+              <a:rPr lang="de-AT" dirty="0" err="1" smtClean="0"/>
+              <a:t>to</a:t>
+            </a:r>
+            <a:r>
+              <a:rPr lang="de-AT" dirty="0" smtClean="0"/>
+              <a:t> </a:t>
+            </a:r>
+            <a:r>
+              <a:rPr lang="de-AT" dirty="0" err="1" smtClean="0"/>
+              <a:t>manipulate</a:t>
+            </a:r>
+            <a:r>
+              <a:rPr lang="de-AT" dirty="0" smtClean="0"/>
+              <a:t> UI</a:t>
+            </a:r>
+          </a:p>
+          <a:p>
+            <a:pPr lvl="1"/>
+            <a:r>
+              <a:rPr lang="de-AT" dirty="0" smtClean="0"/>
+              <a:t>Solution: </a:t>
+            </a:r>
+            <a:r>
               <a:rPr lang="de-AT" smtClean="0"/>
-              <a:t>onCreate</a:t>
+              <a:t>runOnUiThread</a:t>
             </a:r>
             <a:endParaRPr lang="de-AT" dirty="0" smtClean="0"/>
           </a:p>
@@ -5509,7 +5551,7 @@
           <a:p>
             <a:fld id="{78DD3ADE-3785-4F18-93E5-D04CE1BF4F96}" type="datetime1">
               <a:rPr lang="de-AT" smtClean="0"/>
-              <a:t>18.06.2012</a:t>
+              <a:t>20.06.2012</a:t>
             </a:fld>
             <a:endParaRPr lang="de-AT"/>
           </a:p>
@@ -5638,7 +5680,7 @@
           <a:p>
             <a:fld id="{78DD3ADE-3785-4F18-93E5-D04CE1BF4F96}" type="datetime1">
               <a:rPr lang="de-AT" smtClean="0"/>
-              <a:t>18.06.2012</a:t>
+              <a:t>20.06.2012</a:t>
             </a:fld>
             <a:endParaRPr lang="de-AT"/>
           </a:p>
@@ -5865,7 +5907,7 @@
           <a:p>
             <a:fld id="{78DD3ADE-3785-4F18-93E5-D04CE1BF4F96}" type="datetime1">
               <a:rPr lang="de-AT" smtClean="0"/>
-              <a:t>18.06.2012</a:t>
+              <a:t>20.06.2012</a:t>
             </a:fld>
             <a:endParaRPr lang="de-AT"/>
           </a:p>
@@ -6048,7 +6090,7 @@
           <a:p>
             <a:fld id="{78DD3ADE-3785-4F18-93E5-D04CE1BF4F96}" type="datetime1">
               <a:rPr lang="de-AT" smtClean="0"/>
-              <a:t>18.06.2012</a:t>
+              <a:t>20.06.2012</a:t>
             </a:fld>
             <a:endParaRPr lang="de-AT"/>
           </a:p>
@@ -6212,7 +6254,7 @@
           <a:graphicData uri="http://schemas.openxmlformats.org/presentationml/2006/ole">
             <mc:AlternateContent xmlns:mc="http://schemas.openxmlformats.org/markup-compatibility/2006">
               <mc:Choice xmlns:v="urn:schemas-microsoft-com:vml" Requires="v">
-                <p:oleObj spid="_x0000_s1044" name="Visio" r:id="rId3" imgW="6167609" imgH="4817505" progId="Visio.Drawing.11">
+                <p:oleObj spid="_x0000_s1045" name="Visio" r:id="rId3" imgW="6167609" imgH="4817505" progId="Visio.Drawing.11">
                   <p:embed/>
                 </p:oleObj>
               </mc:Choice>
@@ -6428,7 +6470,7 @@
           <a:p>
             <a:fld id="{78DD3ADE-3785-4F18-93E5-D04CE1BF4F96}" type="datetime1">
               <a:rPr lang="de-AT" smtClean="0"/>
-              <a:t>18.06.2012</a:t>
+              <a:t>20.06.2012</a:t>
             </a:fld>
             <a:endParaRPr lang="de-AT"/>
           </a:p>
@@ -6652,7 +6694,7 @@
           <a:p>
             <a:fld id="{78DD3ADE-3785-4F18-93E5-D04CE1BF4F96}" type="datetime1">
               <a:rPr lang="de-AT" smtClean="0"/>
-              <a:t>18.06.2012</a:t>
+              <a:t>20.06.2012</a:t>
             </a:fld>
             <a:endParaRPr lang="de-AT"/>
           </a:p>
@@ -6872,7 +6914,7 @@
           <a:p>
             <a:fld id="{78DD3ADE-3785-4F18-93E5-D04CE1BF4F96}" type="datetime1">
               <a:rPr lang="de-AT" smtClean="0"/>
-              <a:t>18.06.2012</a:t>
+              <a:t>20.06.2012</a:t>
             </a:fld>
             <a:endParaRPr lang="de-AT"/>
           </a:p>
@@ -7001,7 +7043,7 @@
           <a:p>
             <a:fld id="{78DD3ADE-3785-4F18-93E5-D04CE1BF4F96}" type="datetime1">
               <a:rPr lang="de-AT" smtClean="0"/>
-              <a:t>18.06.2012</a:t>
+              <a:t>20.06.2012</a:t>
             </a:fld>
             <a:endParaRPr lang="de-AT"/>
           </a:p>
@@ -7278,7 +7320,7 @@
           <a:p>
             <a:fld id="{78DD3ADE-3785-4F18-93E5-D04CE1BF4F96}" type="datetime1">
               <a:rPr lang="de-AT" smtClean="0"/>
-              <a:t>18.06.2012</a:t>
+              <a:t>20.06.2012</a:t>
             </a:fld>
             <a:endParaRPr lang="de-AT"/>
           </a:p>
@@ -7426,7 +7468,7 @@
           <a:p>
             <a:fld id="{78DD3ADE-3785-4F18-93E5-D04CE1BF4F96}" type="datetime1">
               <a:rPr lang="de-AT" smtClean="0"/>
-              <a:t>18.06.2012</a:t>
+              <a:t>20.06.2012</a:t>
             </a:fld>
             <a:endParaRPr lang="de-AT"/>
           </a:p>

</xml_diff>